<commit_message>
fixing errors on voltage and frequency readings
</commit_message>
<xml_diff>
--- a/QDM065 Test Log/charts.pptx
+++ b/QDM065 Test Log/charts.pptx
@@ -27,6 +27,10 @@
     <p:sldId id="275" r:id="rId26"/>
     <p:sldId id="276" r:id="rId27"/>
     <p:sldId id="277" r:id="rId28"/>
+    <p:sldId id="278" r:id="rId29"/>
+    <p:sldId id="279" r:id="rId30"/>
+    <p:sldId id="280" r:id="rId31"/>
+    <p:sldId id="281" r:id="rId32"/>
   </p:sldIdLst>
   <p:sldSz cx="9144000" cy="6858000" type="screen4x3"/>
   <p:notesSz cx="6858000" cy="9144000"/>
@@ -5334,7 +5338,7 @@
                     <a:lstStyle/>
                     <a:p>
                       <a:r>
-                        <a:t>1575.42</a:t>
+                        <a:t>1830.0</a:t>
                       </a:r>
                     </a:p>
                   </a:txBody>
@@ -5386,7 +5390,7 @@
                     <a:lstStyle/>
                     <a:p>
                       <a:r>
-                        <a:t>25.04</a:t>
+                        <a:t>24.53</a:t>
                       </a:r>
                     </a:p>
                   </a:txBody>
@@ -5412,7 +5416,7 @@
                     <a:lstStyle/>
                     <a:p>
                       <a:r>
-                        <a:t>0.50</a:t>
+                        <a:t>0.47</a:t>
                       </a:r>
                     </a:p>
                   </a:txBody>
@@ -5438,7 +5442,7 @@
                     <a:lstStyle/>
                     <a:p>
                       <a:r>
-                        <a:t>21.57121</a:t>
+                        <a:t>21.18894</a:t>
                       </a:r>
                     </a:p>
                   </a:txBody>
@@ -5464,7 +5468,7 @@
                     <a:lstStyle/>
                     <a:p>
                       <a:r>
-                        <a:t>25.50639</a:t>
+                        <a:t>24.84868</a:t>
                       </a:r>
                     </a:p>
                   </a:txBody>
@@ -5477,7 +5481,7 @@
       </p:graphicFrame>
       <p:pic>
         <p:nvPicPr>
-          <p:cNvPr id="3" name="Picture 2" descr="histogram_RF_conduction_1575.42.png"/>
+          <p:cNvPr id="3" name="Picture 2" descr="histogram_RF_conduction_1830.0.png"/>
           <p:cNvPicPr>
             <a:picLocks noChangeAspect="1"/>
           </p:cNvPicPr>
@@ -5517,44 +5521,212 @@
         <p:nvPr/>
       </p:nvGrpSpPr>
       <p:grpSpPr/>
-      <p:sp>
-        <p:nvSpPr>
-          <p:cNvPr id="2" name="Title 1"/>
-          <p:cNvSpPr>
-            <a:spLocks noGrp="1"/>
-          </p:cNvSpPr>
-          <p:nvPr>
-            <p:ph type="title"/>
-          </p:nvPr>
-        </p:nvSpPr>
-        <p:spPr/>
-        <p:txBody>
-          <a:bodyPr/>
-          <a:lstStyle/>
-          <a:p>
-            <a:r>
-              <a:t>RF_coupling</a:t>
-            </a:r>
-          </a:p>
-        </p:txBody>
-      </p:sp>
-      <p:sp>
-        <p:nvSpPr>
-          <p:cNvPr id="3" name="Content Placeholder 2"/>
-          <p:cNvSpPr>
-            <a:spLocks noGrp="1"/>
-          </p:cNvSpPr>
-          <p:nvPr>
-            <p:ph idx="1"/>
-          </p:nvPr>
-        </p:nvSpPr>
-        <p:spPr/>
-        <p:txBody>
-          <a:bodyPr/>
-          <a:lstStyle/>
-          <a:p/>
-        </p:txBody>
-      </p:sp>
+      <p:graphicFrame>
+        <p:nvGraphicFramePr>
+          <p:cNvPr id="2" name="Table 1"/>
+          <p:cNvGraphicFramePr>
+            <a:graphicFrameLocks noGrp="1"/>
+          </p:cNvGraphicFramePr>
+          <p:nvPr/>
+        </p:nvGraphicFramePr>
+        <p:xfrm>
+          <a:off x="2743200" y="3931920"/>
+          <a:ext cx="3657600" cy="182880"/>
+        </p:xfrm>
+        <a:graphic>
+          <a:graphicData uri="http://schemas.openxmlformats.org/drawingml/2006/table">
+            <a:tbl>
+              <a:tblPr firstRow="1" bandRow="1">
+                <a:tableStyleId>{5C22544A-7EE6-4342-B048-85BDC9FD1C3A}</a:tableStyleId>
+              </a:tblPr>
+              <a:tblGrid>
+                <a:gridCol w="1828800"/>
+                <a:gridCol w="1828800"/>
+              </a:tblGrid>
+              <a:tr h="30480">
+                <a:tc>
+                  <a:txBody>
+                    <a:bodyPr/>
+                    <a:lstStyle/>
+                    <a:p>
+                      <a:r>
+                        <a:t>Frequency</a:t>
+                      </a:r>
+                    </a:p>
+                  </a:txBody>
+                  <a:tcPr/>
+                </a:tc>
+                <a:tc>
+                  <a:txBody>
+                    <a:bodyPr/>
+                    <a:lstStyle/>
+                    <a:p>
+                      <a:r>
+                        <a:t>1957.5</a:t>
+                      </a:r>
+                    </a:p>
+                  </a:txBody>
+                  <a:tcPr/>
+                </a:tc>
+              </a:tr>
+              <a:tr h="30480">
+                <a:tc>
+                  <a:txBody>
+                    <a:bodyPr/>
+                    <a:lstStyle/>
+                    <a:p>
+                      <a:r>
+                        <a:t>Count</a:t>
+                      </a:r>
+                    </a:p>
+                  </a:txBody>
+                  <a:tcPr/>
+                </a:tc>
+                <a:tc>
+                  <a:txBody>
+                    <a:bodyPr/>
+                    <a:lstStyle/>
+                    <a:p>
+                      <a:r>
+                        <a:t>202</a:t>
+                      </a:r>
+                    </a:p>
+                  </a:txBody>
+                  <a:tcPr/>
+                </a:tc>
+              </a:tr>
+              <a:tr h="30480">
+                <a:tc>
+                  <a:txBody>
+                    <a:bodyPr/>
+                    <a:lstStyle/>
+                    <a:p>
+                      <a:r>
+                        <a:t>Mean</a:t>
+                      </a:r>
+                    </a:p>
+                  </a:txBody>
+                  <a:tcPr/>
+                </a:tc>
+                <a:tc>
+                  <a:txBody>
+                    <a:bodyPr/>
+                    <a:lstStyle/>
+                    <a:p>
+                      <a:r>
+                        <a:t>24.90</a:t>
+                      </a:r>
+                    </a:p>
+                  </a:txBody>
+                  <a:tcPr/>
+                </a:tc>
+              </a:tr>
+              <a:tr h="30480">
+                <a:tc>
+                  <a:txBody>
+                    <a:bodyPr/>
+                    <a:lstStyle/>
+                    <a:p>
+                      <a:r>
+                        <a:t>Std</a:t>
+                      </a:r>
+                    </a:p>
+                  </a:txBody>
+                  <a:tcPr/>
+                </a:tc>
+                <a:tc>
+                  <a:txBody>
+                    <a:bodyPr/>
+                    <a:lstStyle/>
+                    <a:p>
+                      <a:r>
+                        <a:t>0.49</a:t>
+                      </a:r>
+                    </a:p>
+                  </a:txBody>
+                  <a:tcPr/>
+                </a:tc>
+              </a:tr>
+              <a:tr h="30480">
+                <a:tc>
+                  <a:txBody>
+                    <a:bodyPr/>
+                    <a:lstStyle/>
+                    <a:p>
+                      <a:r>
+                        <a:t>Min</a:t>
+                      </a:r>
+                    </a:p>
+                  </a:txBody>
+                  <a:tcPr/>
+                </a:tc>
+                <a:tc>
+                  <a:txBody>
+                    <a:bodyPr/>
+                    <a:lstStyle/>
+                    <a:p>
+                      <a:r>
+                        <a:t>21.49971</a:t>
+                      </a:r>
+                    </a:p>
+                  </a:txBody>
+                  <a:tcPr/>
+                </a:tc>
+              </a:tr>
+              <a:tr h="30480">
+                <a:tc>
+                  <a:txBody>
+                    <a:bodyPr/>
+                    <a:lstStyle/>
+                    <a:p>
+                      <a:r>
+                        <a:t>Max</a:t>
+                      </a:r>
+                    </a:p>
+                  </a:txBody>
+                  <a:tcPr/>
+                </a:tc>
+                <a:tc>
+                  <a:txBody>
+                    <a:bodyPr/>
+                    <a:lstStyle/>
+                    <a:p>
+                      <a:r>
+                        <a:t>25.3505</a:t>
+                      </a:r>
+                    </a:p>
+                  </a:txBody>
+                  <a:tcPr/>
+                </a:tc>
+              </a:tr>
+            </a:tbl>
+          </a:graphicData>
+        </a:graphic>
+      </p:graphicFrame>
+      <p:pic>
+        <p:nvPicPr>
+          <p:cNvPr id="3" name="Picture 2" descr="histogram_RF_conduction_1957.5.png"/>
+          <p:cNvPicPr>
+            <a:picLocks noChangeAspect="1"/>
+          </p:cNvPicPr>
+          <p:nvPr/>
+        </p:nvPicPr>
+        <p:blipFill>
+          <a:blip r:embed="rId2"/>
+          <a:stretch>
+            <a:fillRect/>
+          </a:stretch>
+        </p:blipFill>
+        <p:spPr>
+          <a:xfrm>
+            <a:off x="914400" y="91440"/>
+            <a:ext cx="7315200" cy="3657600"/>
+          </a:xfrm>
+          <a:prstGeom prst="rect">
+            <a:avLst/>
+          </a:prstGeom>
+        </p:spPr>
+      </p:pic>
     </p:spTree>
   </p:cSld>
   <p:clrMapOvr>
@@ -5614,7 +5786,7 @@
                     <a:lstStyle/>
                     <a:p>
                       <a:r>
-                        <a:t>1575.42</a:t>
+                        <a:t>2052.5</a:t>
                       </a:r>
                     </a:p>
                   </a:txBody>
@@ -5640,7 +5812,7 @@
                     <a:lstStyle/>
                     <a:p>
                       <a:r>
-                        <a:t>194</a:t>
+                        <a:t>202</a:t>
                       </a:r>
                     </a:p>
                   </a:txBody>
@@ -5666,7 +5838,7 @@
                     <a:lstStyle/>
                     <a:p>
                       <a:r>
-                        <a:t>25.19</a:t>
+                        <a:t>25.04</a:t>
                       </a:r>
                     </a:p>
                   </a:txBody>
@@ -5692,7 +5864,7 @@
                     <a:lstStyle/>
                     <a:p>
                       <a:r>
-                        <a:t>0.25</a:t>
+                        <a:t>0.50</a:t>
                       </a:r>
                     </a:p>
                   </a:txBody>
@@ -5718,7 +5890,7 @@
                     <a:lstStyle/>
                     <a:p>
                       <a:r>
-                        <a:t>23.84784</a:t>
+                        <a:t>21.57121</a:t>
                       </a:r>
                     </a:p>
                   </a:txBody>
@@ -5744,7 +5916,7 @@
                     <a:lstStyle/>
                     <a:p>
                       <a:r>
-                        <a:t>25.74376</a:t>
+                        <a:t>25.50639</a:t>
                       </a:r>
                     </a:p>
                   </a:txBody>
@@ -5757,7 +5929,735 @@
       </p:graphicFrame>
       <p:pic>
         <p:nvPicPr>
-          <p:cNvPr id="3" name="Picture 2" descr="histogram_RF_coupling_1575.42.png"/>
+          <p:cNvPr id="3" name="Picture 2" descr="histogram_RF_conduction_2052.5.png"/>
+          <p:cNvPicPr>
+            <a:picLocks noChangeAspect="1"/>
+          </p:cNvPicPr>
+          <p:nvPr/>
+        </p:nvPicPr>
+        <p:blipFill>
+          <a:blip r:embed="rId2"/>
+          <a:stretch>
+            <a:fillRect/>
+          </a:stretch>
+        </p:blipFill>
+        <p:spPr>
+          <a:xfrm>
+            <a:off x="914400" y="91440"/>
+            <a:ext cx="7315200" cy="3657600"/>
+          </a:xfrm>
+          <a:prstGeom prst="rect">
+            <a:avLst/>
+          </a:prstGeom>
+        </p:spPr>
+      </p:pic>
+    </p:spTree>
+  </p:cSld>
+  <p:clrMapOvr>
+    <a:masterClrMapping/>
+  </p:clrMapOvr>
+</p:sld>
+</file>
+
+<file path=ppt/slides/slide23.xml><?xml version="1.0" encoding="utf-8"?>
+<p:sld xmlns:a="http://schemas.openxmlformats.org/drawingml/2006/main" xmlns:p="http://schemas.openxmlformats.org/presentationml/2006/main" xmlns:r="http://schemas.openxmlformats.org/officeDocument/2006/relationships">
+  <p:cSld>
+    <p:spTree>
+      <p:nvGrpSpPr>
+        <p:cNvPr id="1" name=""/>
+        <p:cNvGrpSpPr/>
+        <p:nvPr/>
+      </p:nvGrpSpPr>
+      <p:grpSpPr/>
+      <p:sp>
+        <p:nvSpPr>
+          <p:cNvPr id="2" name="Title 1"/>
+          <p:cNvSpPr>
+            <a:spLocks noGrp="1"/>
+          </p:cNvSpPr>
+          <p:nvPr>
+            <p:ph type="title"/>
+          </p:nvPr>
+        </p:nvSpPr>
+        <p:spPr/>
+        <p:txBody>
+          <a:bodyPr/>
+          <a:lstStyle/>
+          <a:p>
+            <a:r>
+              <a:t>RF_coupling</a:t>
+            </a:r>
+          </a:p>
+        </p:txBody>
+      </p:sp>
+      <p:sp>
+        <p:nvSpPr>
+          <p:cNvPr id="3" name="Content Placeholder 2"/>
+          <p:cNvSpPr>
+            <a:spLocks noGrp="1"/>
+          </p:cNvSpPr>
+          <p:nvPr>
+            <p:ph idx="1"/>
+          </p:nvPr>
+        </p:nvSpPr>
+        <p:spPr/>
+        <p:txBody>
+          <a:bodyPr/>
+          <a:lstStyle/>
+          <a:p/>
+        </p:txBody>
+      </p:sp>
+    </p:spTree>
+  </p:cSld>
+  <p:clrMapOvr>
+    <a:masterClrMapping/>
+  </p:clrMapOvr>
+</p:sld>
+</file>
+
+<file path=ppt/slides/slide24.xml><?xml version="1.0" encoding="utf-8"?>
+<p:sld xmlns:a="http://schemas.openxmlformats.org/drawingml/2006/main" xmlns:p="http://schemas.openxmlformats.org/presentationml/2006/main" xmlns:r="http://schemas.openxmlformats.org/officeDocument/2006/relationships">
+  <p:cSld>
+    <p:spTree>
+      <p:nvGrpSpPr>
+        <p:cNvPr id="1" name=""/>
+        <p:cNvGrpSpPr/>
+        <p:nvPr/>
+      </p:nvGrpSpPr>
+      <p:grpSpPr/>
+      <p:graphicFrame>
+        <p:nvGraphicFramePr>
+          <p:cNvPr id="2" name="Table 1"/>
+          <p:cNvGraphicFramePr>
+            <a:graphicFrameLocks noGrp="1"/>
+          </p:cNvGraphicFramePr>
+          <p:nvPr/>
+        </p:nvGraphicFramePr>
+        <p:xfrm>
+          <a:off x="2743200" y="3931920"/>
+          <a:ext cx="3657600" cy="182880"/>
+        </p:xfrm>
+        <a:graphic>
+          <a:graphicData uri="http://schemas.openxmlformats.org/drawingml/2006/table">
+            <a:tbl>
+              <a:tblPr firstRow="1" bandRow="1">
+                <a:tableStyleId>{5C22544A-7EE6-4342-B048-85BDC9FD1C3A}</a:tableStyleId>
+              </a:tblPr>
+              <a:tblGrid>
+                <a:gridCol w="1828800"/>
+                <a:gridCol w="1828800"/>
+              </a:tblGrid>
+              <a:tr h="30480">
+                <a:tc>
+                  <a:txBody>
+                    <a:bodyPr/>
+                    <a:lstStyle/>
+                    <a:p>
+                      <a:r>
+                        <a:t>Frequency</a:t>
+                      </a:r>
+                    </a:p>
+                  </a:txBody>
+                  <a:tcPr/>
+                </a:tc>
+                <a:tc>
+                  <a:txBody>
+                    <a:bodyPr/>
+                    <a:lstStyle/>
+                    <a:p>
+                      <a:r>
+                        <a:t>1830.0</a:t>
+                      </a:r>
+                    </a:p>
+                  </a:txBody>
+                  <a:tcPr/>
+                </a:tc>
+              </a:tr>
+              <a:tr h="30480">
+                <a:tc>
+                  <a:txBody>
+                    <a:bodyPr/>
+                    <a:lstStyle/>
+                    <a:p>
+                      <a:r>
+                        <a:t>Count</a:t>
+                      </a:r>
+                    </a:p>
+                  </a:txBody>
+                  <a:tcPr/>
+                </a:tc>
+                <a:tc>
+                  <a:txBody>
+                    <a:bodyPr/>
+                    <a:lstStyle/>
+                    <a:p>
+                      <a:r>
+                        <a:t>194</a:t>
+                      </a:r>
+                    </a:p>
+                  </a:txBody>
+                  <a:tcPr/>
+                </a:tc>
+              </a:tr>
+              <a:tr h="30480">
+                <a:tc>
+                  <a:txBody>
+                    <a:bodyPr/>
+                    <a:lstStyle/>
+                    <a:p>
+                      <a:r>
+                        <a:t>Mean</a:t>
+                      </a:r>
+                    </a:p>
+                  </a:txBody>
+                  <a:tcPr/>
+                </a:tc>
+                <a:tc>
+                  <a:txBody>
+                    <a:bodyPr/>
+                    <a:lstStyle/>
+                    <a:p>
+                      <a:r>
+                        <a:t>21.64</a:t>
+                      </a:r>
+                    </a:p>
+                  </a:txBody>
+                  <a:tcPr/>
+                </a:tc>
+              </a:tr>
+              <a:tr h="30480">
+                <a:tc>
+                  <a:txBody>
+                    <a:bodyPr/>
+                    <a:lstStyle/>
+                    <a:p>
+                      <a:r>
+                        <a:t>Std</a:t>
+                      </a:r>
+                    </a:p>
+                  </a:txBody>
+                  <a:tcPr/>
+                </a:tc>
+                <a:tc>
+                  <a:txBody>
+                    <a:bodyPr/>
+                    <a:lstStyle/>
+                    <a:p>
+                      <a:r>
+                        <a:t>0.29</a:t>
+                      </a:r>
+                    </a:p>
+                  </a:txBody>
+                  <a:tcPr/>
+                </a:tc>
+              </a:tr>
+              <a:tr h="30480">
+                <a:tc>
+                  <a:txBody>
+                    <a:bodyPr/>
+                    <a:lstStyle/>
+                    <a:p>
+                      <a:r>
+                        <a:t>Min</a:t>
+                      </a:r>
+                    </a:p>
+                  </a:txBody>
+                  <a:tcPr/>
+                </a:tc>
+                <a:tc>
+                  <a:txBody>
+                    <a:bodyPr/>
+                    <a:lstStyle/>
+                    <a:p>
+                      <a:r>
+                        <a:t>20.5793</a:t>
+                      </a:r>
+                    </a:p>
+                  </a:txBody>
+                  <a:tcPr/>
+                </a:tc>
+              </a:tr>
+              <a:tr h="30480">
+                <a:tc>
+                  <a:txBody>
+                    <a:bodyPr/>
+                    <a:lstStyle/>
+                    <a:p>
+                      <a:r>
+                        <a:t>Max</a:t>
+                      </a:r>
+                    </a:p>
+                  </a:txBody>
+                  <a:tcPr/>
+                </a:tc>
+                <a:tc>
+                  <a:txBody>
+                    <a:bodyPr/>
+                    <a:lstStyle/>
+                    <a:p>
+                      <a:r>
+                        <a:t>22.33126</a:t>
+                      </a:r>
+                    </a:p>
+                  </a:txBody>
+                  <a:tcPr/>
+                </a:tc>
+              </a:tr>
+            </a:tbl>
+          </a:graphicData>
+        </a:graphic>
+      </p:graphicFrame>
+      <p:pic>
+        <p:nvPicPr>
+          <p:cNvPr id="3" name="Picture 2" descr="histogram_RF_coupling_1830.0.png"/>
+          <p:cNvPicPr>
+            <a:picLocks noChangeAspect="1"/>
+          </p:cNvPicPr>
+          <p:nvPr/>
+        </p:nvPicPr>
+        <p:blipFill>
+          <a:blip r:embed="rId2"/>
+          <a:stretch>
+            <a:fillRect/>
+          </a:stretch>
+        </p:blipFill>
+        <p:spPr>
+          <a:xfrm>
+            <a:off x="914400" y="91440"/>
+            <a:ext cx="7315200" cy="3657600"/>
+          </a:xfrm>
+          <a:prstGeom prst="rect">
+            <a:avLst/>
+          </a:prstGeom>
+        </p:spPr>
+      </p:pic>
+    </p:spTree>
+  </p:cSld>
+  <p:clrMapOvr>
+    <a:masterClrMapping/>
+  </p:clrMapOvr>
+</p:sld>
+</file>
+
+<file path=ppt/slides/slide25.xml><?xml version="1.0" encoding="utf-8"?>
+<p:sld xmlns:a="http://schemas.openxmlformats.org/drawingml/2006/main" xmlns:p="http://schemas.openxmlformats.org/presentationml/2006/main" xmlns:r="http://schemas.openxmlformats.org/officeDocument/2006/relationships">
+  <p:cSld>
+    <p:spTree>
+      <p:nvGrpSpPr>
+        <p:cNvPr id="1" name=""/>
+        <p:cNvGrpSpPr/>
+        <p:nvPr/>
+      </p:nvGrpSpPr>
+      <p:grpSpPr/>
+      <p:graphicFrame>
+        <p:nvGraphicFramePr>
+          <p:cNvPr id="2" name="Table 1"/>
+          <p:cNvGraphicFramePr>
+            <a:graphicFrameLocks noGrp="1"/>
+          </p:cNvGraphicFramePr>
+          <p:nvPr/>
+        </p:nvGraphicFramePr>
+        <p:xfrm>
+          <a:off x="2743200" y="3931920"/>
+          <a:ext cx="3657600" cy="182880"/>
+        </p:xfrm>
+        <a:graphic>
+          <a:graphicData uri="http://schemas.openxmlformats.org/drawingml/2006/table">
+            <a:tbl>
+              <a:tblPr firstRow="1" bandRow="1">
+                <a:tableStyleId>{5C22544A-7EE6-4342-B048-85BDC9FD1C3A}</a:tableStyleId>
+              </a:tblPr>
+              <a:tblGrid>
+                <a:gridCol w="1828800"/>
+                <a:gridCol w="1828800"/>
+              </a:tblGrid>
+              <a:tr h="30480">
+                <a:tc>
+                  <a:txBody>
+                    <a:bodyPr/>
+                    <a:lstStyle/>
+                    <a:p>
+                      <a:r>
+                        <a:t>Frequency</a:t>
+                      </a:r>
+                    </a:p>
+                  </a:txBody>
+                  <a:tcPr/>
+                </a:tc>
+                <a:tc>
+                  <a:txBody>
+                    <a:bodyPr/>
+                    <a:lstStyle/>
+                    <a:p>
+                      <a:r>
+                        <a:t>1957.5</a:t>
+                      </a:r>
+                    </a:p>
+                  </a:txBody>
+                  <a:tcPr/>
+                </a:tc>
+              </a:tr>
+              <a:tr h="30480">
+                <a:tc>
+                  <a:txBody>
+                    <a:bodyPr/>
+                    <a:lstStyle/>
+                    <a:p>
+                      <a:r>
+                        <a:t>Count</a:t>
+                      </a:r>
+                    </a:p>
+                  </a:txBody>
+                  <a:tcPr/>
+                </a:tc>
+                <a:tc>
+                  <a:txBody>
+                    <a:bodyPr/>
+                    <a:lstStyle/>
+                    <a:p>
+                      <a:r>
+                        <a:t>194</a:t>
+                      </a:r>
+                    </a:p>
+                  </a:txBody>
+                  <a:tcPr/>
+                </a:tc>
+              </a:tr>
+              <a:tr h="30480">
+                <a:tc>
+                  <a:txBody>
+                    <a:bodyPr/>
+                    <a:lstStyle/>
+                    <a:p>
+                      <a:r>
+                        <a:t>Mean</a:t>
+                      </a:r>
+                    </a:p>
+                  </a:txBody>
+                  <a:tcPr/>
+                </a:tc>
+                <a:tc>
+                  <a:txBody>
+                    <a:bodyPr/>
+                    <a:lstStyle/>
+                    <a:p>
+                      <a:r>
+                        <a:t>24.17</a:t>
+                      </a:r>
+                    </a:p>
+                  </a:txBody>
+                  <a:tcPr/>
+                </a:tc>
+              </a:tr>
+              <a:tr h="30480">
+                <a:tc>
+                  <a:txBody>
+                    <a:bodyPr/>
+                    <a:lstStyle/>
+                    <a:p>
+                      <a:r>
+                        <a:t>Std</a:t>
+                      </a:r>
+                    </a:p>
+                  </a:txBody>
+                  <a:tcPr/>
+                </a:tc>
+                <a:tc>
+                  <a:txBody>
+                    <a:bodyPr/>
+                    <a:lstStyle/>
+                    <a:p>
+                      <a:r>
+                        <a:t>0.16</a:t>
+                      </a:r>
+                    </a:p>
+                  </a:txBody>
+                  <a:tcPr/>
+                </a:tc>
+              </a:tr>
+              <a:tr h="30480">
+                <a:tc>
+                  <a:txBody>
+                    <a:bodyPr/>
+                    <a:lstStyle/>
+                    <a:p>
+                      <a:r>
+                        <a:t>Min</a:t>
+                      </a:r>
+                    </a:p>
+                  </a:txBody>
+                  <a:tcPr/>
+                </a:tc>
+                <a:tc>
+                  <a:txBody>
+                    <a:bodyPr/>
+                    <a:lstStyle/>
+                    <a:p>
+                      <a:r>
+                        <a:t>23.58266</a:t>
+                      </a:r>
+                    </a:p>
+                  </a:txBody>
+                  <a:tcPr/>
+                </a:tc>
+              </a:tr>
+              <a:tr h="30480">
+                <a:tc>
+                  <a:txBody>
+                    <a:bodyPr/>
+                    <a:lstStyle/>
+                    <a:p>
+                      <a:r>
+                        <a:t>Max</a:t>
+                      </a:r>
+                    </a:p>
+                  </a:txBody>
+                  <a:tcPr/>
+                </a:tc>
+                <a:tc>
+                  <a:txBody>
+                    <a:bodyPr/>
+                    <a:lstStyle/>
+                    <a:p>
+                      <a:r>
+                        <a:t>24.54999</a:t>
+                      </a:r>
+                    </a:p>
+                  </a:txBody>
+                  <a:tcPr/>
+                </a:tc>
+              </a:tr>
+            </a:tbl>
+          </a:graphicData>
+        </a:graphic>
+      </p:graphicFrame>
+      <p:pic>
+        <p:nvPicPr>
+          <p:cNvPr id="3" name="Picture 2" descr="histogram_RF_coupling_1957.5.png"/>
+          <p:cNvPicPr>
+            <a:picLocks noChangeAspect="1"/>
+          </p:cNvPicPr>
+          <p:nvPr/>
+        </p:nvPicPr>
+        <p:blipFill>
+          <a:blip r:embed="rId2"/>
+          <a:stretch>
+            <a:fillRect/>
+          </a:stretch>
+        </p:blipFill>
+        <p:spPr>
+          <a:xfrm>
+            <a:off x="914400" y="91440"/>
+            <a:ext cx="7315200" cy="3657600"/>
+          </a:xfrm>
+          <a:prstGeom prst="rect">
+            <a:avLst/>
+          </a:prstGeom>
+        </p:spPr>
+      </p:pic>
+    </p:spTree>
+  </p:cSld>
+  <p:clrMapOvr>
+    <a:masterClrMapping/>
+  </p:clrMapOvr>
+</p:sld>
+</file>
+
+<file path=ppt/slides/slide26.xml><?xml version="1.0" encoding="utf-8"?>
+<p:sld xmlns:a="http://schemas.openxmlformats.org/drawingml/2006/main" xmlns:p="http://schemas.openxmlformats.org/presentationml/2006/main" xmlns:r="http://schemas.openxmlformats.org/officeDocument/2006/relationships">
+  <p:cSld>
+    <p:spTree>
+      <p:nvGrpSpPr>
+        <p:cNvPr id="1" name=""/>
+        <p:cNvGrpSpPr/>
+        <p:nvPr/>
+      </p:nvGrpSpPr>
+      <p:grpSpPr/>
+      <p:graphicFrame>
+        <p:nvGraphicFramePr>
+          <p:cNvPr id="2" name="Table 1"/>
+          <p:cNvGraphicFramePr>
+            <a:graphicFrameLocks noGrp="1"/>
+          </p:cNvGraphicFramePr>
+          <p:nvPr/>
+        </p:nvGraphicFramePr>
+        <p:xfrm>
+          <a:off x="2743200" y="3931920"/>
+          <a:ext cx="3657600" cy="182880"/>
+        </p:xfrm>
+        <a:graphic>
+          <a:graphicData uri="http://schemas.openxmlformats.org/drawingml/2006/table">
+            <a:tbl>
+              <a:tblPr firstRow="1" bandRow="1">
+                <a:tableStyleId>{5C22544A-7EE6-4342-B048-85BDC9FD1C3A}</a:tableStyleId>
+              </a:tblPr>
+              <a:tblGrid>
+                <a:gridCol w="1828800"/>
+                <a:gridCol w="1828800"/>
+              </a:tblGrid>
+              <a:tr h="30480">
+                <a:tc>
+                  <a:txBody>
+                    <a:bodyPr/>
+                    <a:lstStyle/>
+                    <a:p>
+                      <a:r>
+                        <a:t>Frequency</a:t>
+                      </a:r>
+                    </a:p>
+                  </a:txBody>
+                  <a:tcPr/>
+                </a:tc>
+                <a:tc>
+                  <a:txBody>
+                    <a:bodyPr/>
+                    <a:lstStyle/>
+                    <a:p>
+                      <a:r>
+                        <a:t>2052.5</a:t>
+                      </a:r>
+                    </a:p>
+                  </a:txBody>
+                  <a:tcPr/>
+                </a:tc>
+              </a:tr>
+              <a:tr h="30480">
+                <a:tc>
+                  <a:txBody>
+                    <a:bodyPr/>
+                    <a:lstStyle/>
+                    <a:p>
+                      <a:r>
+                        <a:t>Count</a:t>
+                      </a:r>
+                    </a:p>
+                  </a:txBody>
+                  <a:tcPr/>
+                </a:tc>
+                <a:tc>
+                  <a:txBody>
+                    <a:bodyPr/>
+                    <a:lstStyle/>
+                    <a:p>
+                      <a:r>
+                        <a:t>194</a:t>
+                      </a:r>
+                    </a:p>
+                  </a:txBody>
+                  <a:tcPr/>
+                </a:tc>
+              </a:tr>
+              <a:tr h="30480">
+                <a:tc>
+                  <a:txBody>
+                    <a:bodyPr/>
+                    <a:lstStyle/>
+                    <a:p>
+                      <a:r>
+                        <a:t>Mean</a:t>
+                      </a:r>
+                    </a:p>
+                  </a:txBody>
+                  <a:tcPr/>
+                </a:tc>
+                <a:tc>
+                  <a:txBody>
+                    <a:bodyPr/>
+                    <a:lstStyle/>
+                    <a:p>
+                      <a:r>
+                        <a:t>25.19</a:t>
+                      </a:r>
+                    </a:p>
+                  </a:txBody>
+                  <a:tcPr/>
+                </a:tc>
+              </a:tr>
+              <a:tr h="30480">
+                <a:tc>
+                  <a:txBody>
+                    <a:bodyPr/>
+                    <a:lstStyle/>
+                    <a:p>
+                      <a:r>
+                        <a:t>Std</a:t>
+                      </a:r>
+                    </a:p>
+                  </a:txBody>
+                  <a:tcPr/>
+                </a:tc>
+                <a:tc>
+                  <a:txBody>
+                    <a:bodyPr/>
+                    <a:lstStyle/>
+                    <a:p>
+                      <a:r>
+                        <a:t>0.25</a:t>
+                      </a:r>
+                    </a:p>
+                  </a:txBody>
+                  <a:tcPr/>
+                </a:tc>
+              </a:tr>
+              <a:tr h="30480">
+                <a:tc>
+                  <a:txBody>
+                    <a:bodyPr/>
+                    <a:lstStyle/>
+                    <a:p>
+                      <a:r>
+                        <a:t>Min</a:t>
+                      </a:r>
+                    </a:p>
+                  </a:txBody>
+                  <a:tcPr/>
+                </a:tc>
+                <a:tc>
+                  <a:txBody>
+                    <a:bodyPr/>
+                    <a:lstStyle/>
+                    <a:p>
+                      <a:r>
+                        <a:t>23.84784</a:t>
+                      </a:r>
+                    </a:p>
+                  </a:txBody>
+                  <a:tcPr/>
+                </a:tc>
+              </a:tr>
+              <a:tr h="30480">
+                <a:tc>
+                  <a:txBody>
+                    <a:bodyPr/>
+                    <a:lstStyle/>
+                    <a:p>
+                      <a:r>
+                        <a:t>Max</a:t>
+                      </a:r>
+                    </a:p>
+                  </a:txBody>
+                  <a:tcPr/>
+                </a:tc>
+                <a:tc>
+                  <a:txBody>
+                    <a:bodyPr/>
+                    <a:lstStyle/>
+                    <a:p>
+                      <a:r>
+                        <a:t>25.74376</a:t>
+                      </a:r>
+                    </a:p>
+                  </a:txBody>
+                  <a:tcPr/>
+                </a:tc>
+              </a:tr>
+            </a:tbl>
+          </a:graphicData>
+        </a:graphic>
+      </p:graphicFrame>
+      <p:pic>
+        <p:nvPicPr>
+          <p:cNvPr id="3" name="Picture 2" descr="histogram_RF_coupling_2052.5.png"/>
           <p:cNvPicPr>
             <a:picLocks noChangeAspect="1"/>
           </p:cNvPicPr>
@@ -7234,7 +8134,7 @@
                     <a:lstStyle/>
                     <a:p>
                       <a:r>
-                        <a:t>1358.36</a:t>
+                        <a:t>3736.66</a:t>
                       </a:r>
                     </a:p>
                   </a:txBody>
@@ -7260,7 +8160,7 @@
                     <a:lstStyle/>
                     <a:p>
                       <a:r>
-                        <a:t>847.63</a:t>
+                        <a:t>192.64</a:t>
                       </a:r>
                     </a:p>
                   </a:txBody>
@@ -7286,7 +8186,7 @@
                     <a:lstStyle/>
                     <a:p>
                       <a:r>
-                        <a:t>1078.533</a:t>
+                        <a:t>2928.0</a:t>
                       </a:r>
                     </a:p>
                   </a:txBody>
@@ -7312,7 +8212,7 @@
                     <a:lstStyle/>
                     <a:p>
                       <a:r>
-                        <a:t>9328.884</a:t>
+                        <a:t>4148.0</a:t>
                       </a:r>
                     </a:p>
                   </a:txBody>

</xml_diff>